<commit_message>
some new figures and the code.
</commit_message>
<xml_diff>
--- a/IROS17/pictures/pdf/friction.pptx
+++ b/IROS17/pictures/pdf/friction.pptx
@@ -7,7 +7,7 @@
   <p:sldIdLst>
     <p:sldId id="256" r:id="rId2"/>
   </p:sldIdLst>
-  <p:sldSz cx="13716000" cy="4572000"/>
+  <p:sldSz cx="9144000" cy="4572000"/>
   <p:notesSz cx="6858000" cy="9144000"/>
   <p:defaultTextStyle>
     <a:defPPr>
@@ -136,8 +136,8 @@
         </p:nvSpPr>
         <p:spPr>
           <a:xfrm>
-            <a:off x="1028700" y="1420284"/>
-            <a:ext cx="11658600" cy="980017"/>
+            <a:off x="685800" y="1420284"/>
+            <a:ext cx="7772400" cy="980017"/>
           </a:xfrm>
         </p:spPr>
         <p:txBody>
@@ -164,8 +164,8 @@
         </p:nvSpPr>
         <p:spPr>
           <a:xfrm>
-            <a:off x="2057400" y="2590800"/>
-            <a:ext cx="9601200" cy="1168400"/>
+            <a:off x="1371600" y="2590800"/>
+            <a:ext cx="6400800" cy="1168400"/>
           </a:xfrm>
         </p:spPr>
         <p:txBody>
@@ -288,7 +288,7 @@
           <a:p>
             <a:fld id="{6666019B-6789-7642-8563-2C9E17E98A28}" type="datetimeFigureOut">
               <a:rPr lang="en-US" smtClean="0"/>
-              <a:t>12/6/16</a:t>
+              <a:t>2/17/17</a:t>
             </a:fld>
             <a:endParaRPr lang="en-US"/>
           </a:p>
@@ -458,7 +458,7 @@
           <a:p>
             <a:fld id="{6666019B-6789-7642-8563-2C9E17E98A28}" type="datetimeFigureOut">
               <a:rPr lang="en-US" smtClean="0"/>
-              <a:t>12/6/16</a:t>
+              <a:t>2/17/17</a:t>
             </a:fld>
             <a:endParaRPr lang="en-US"/>
           </a:p>
@@ -548,8 +548,8 @@
         </p:nvSpPr>
         <p:spPr>
           <a:xfrm>
-            <a:off x="6960397" y="121712"/>
-            <a:ext cx="2159792" cy="2601383"/>
+            <a:off x="4640265" y="121713"/>
+            <a:ext cx="1439861" cy="2601383"/>
           </a:xfrm>
         </p:spPr>
         <p:txBody>
@@ -576,8 +576,8 @@
         </p:nvSpPr>
         <p:spPr>
           <a:xfrm>
-            <a:off x="481012" y="121712"/>
-            <a:ext cx="6250784" cy="2601383"/>
+            <a:off x="320675" y="121713"/>
+            <a:ext cx="4167189" cy="2601383"/>
           </a:xfrm>
         </p:spPr>
         <p:txBody>
@@ -638,7 +638,7 @@
           <a:p>
             <a:fld id="{6666019B-6789-7642-8563-2C9E17E98A28}" type="datetimeFigureOut">
               <a:rPr lang="en-US" smtClean="0"/>
-              <a:t>12/6/16</a:t>
+              <a:t>2/17/17</a:t>
             </a:fld>
             <a:endParaRPr lang="en-US"/>
           </a:p>
@@ -808,7 +808,7 @@
           <a:p>
             <a:fld id="{6666019B-6789-7642-8563-2C9E17E98A28}" type="datetimeFigureOut">
               <a:rPr lang="en-US" smtClean="0"/>
-              <a:t>12/6/16</a:t>
+              <a:t>2/17/17</a:t>
             </a:fld>
             <a:endParaRPr lang="en-US"/>
           </a:p>
@@ -898,8 +898,8 @@
         </p:nvSpPr>
         <p:spPr>
           <a:xfrm>
-            <a:off x="1083470" y="2937934"/>
-            <a:ext cx="11658600" cy="908050"/>
+            <a:off x="722313" y="2937934"/>
+            <a:ext cx="7772400" cy="908050"/>
           </a:xfrm>
         </p:spPr>
         <p:txBody>
@@ -930,8 +930,8 @@
         </p:nvSpPr>
         <p:spPr>
           <a:xfrm>
-            <a:off x="1083470" y="1937812"/>
-            <a:ext cx="11658600" cy="1000125"/>
+            <a:off x="722313" y="1937813"/>
+            <a:ext cx="7772400" cy="1000125"/>
           </a:xfrm>
         </p:spPr>
         <p:txBody>
@@ -1054,7 +1054,7 @@
           <a:p>
             <a:fld id="{6666019B-6789-7642-8563-2C9E17E98A28}" type="datetimeFigureOut">
               <a:rPr lang="en-US" smtClean="0"/>
-              <a:t>12/6/16</a:t>
+              <a:t>2/17/17</a:t>
             </a:fld>
             <a:endParaRPr lang="en-US"/>
           </a:p>
@@ -1167,8 +1167,8 @@
         </p:nvSpPr>
         <p:spPr>
           <a:xfrm>
-            <a:off x="481014" y="711200"/>
-            <a:ext cx="4205289" cy="2011892"/>
+            <a:off x="320676" y="711200"/>
+            <a:ext cx="2803526" cy="2011892"/>
           </a:xfrm>
         </p:spPr>
         <p:txBody>
@@ -1252,8 +1252,8 @@
         </p:nvSpPr>
         <p:spPr>
           <a:xfrm>
-            <a:off x="4914900" y="711200"/>
-            <a:ext cx="4205289" cy="2011892"/>
+            <a:off x="3276600" y="711200"/>
+            <a:ext cx="2803526" cy="2011892"/>
           </a:xfrm>
         </p:spPr>
         <p:txBody>
@@ -1342,7 +1342,7 @@
           <a:p>
             <a:fld id="{6666019B-6789-7642-8563-2C9E17E98A28}" type="datetimeFigureOut">
               <a:rPr lang="en-US" smtClean="0"/>
-              <a:t>12/6/16</a:t>
+              <a:t>2/17/17</a:t>
             </a:fld>
             <a:endParaRPr lang="en-US"/>
           </a:p>
@@ -1432,8 +1432,8 @@
         </p:nvSpPr>
         <p:spPr>
           <a:xfrm>
-            <a:off x="685800" y="183092"/>
-            <a:ext cx="12344400" cy="762000"/>
+            <a:off x="457200" y="183092"/>
+            <a:ext cx="8229600" cy="762000"/>
           </a:xfrm>
         </p:spPr>
         <p:txBody>
@@ -1464,8 +1464,8 @@
         </p:nvSpPr>
         <p:spPr>
           <a:xfrm>
-            <a:off x="685801" y="1023409"/>
-            <a:ext cx="6060284" cy="426508"/>
+            <a:off x="457201" y="1023409"/>
+            <a:ext cx="4040189" cy="426508"/>
           </a:xfrm>
         </p:spPr>
         <p:txBody>
@@ -1529,8 +1529,8 @@
         </p:nvSpPr>
         <p:spPr>
           <a:xfrm>
-            <a:off x="685801" y="1449917"/>
-            <a:ext cx="6060284" cy="2634192"/>
+            <a:off x="457201" y="1449917"/>
+            <a:ext cx="4040189" cy="2634192"/>
           </a:xfrm>
         </p:spPr>
         <p:txBody>
@@ -1614,8 +1614,8 @@
         </p:nvSpPr>
         <p:spPr>
           <a:xfrm>
-            <a:off x="6967539" y="1023409"/>
-            <a:ext cx="6062664" cy="426508"/>
+            <a:off x="4645026" y="1023409"/>
+            <a:ext cx="4041776" cy="426508"/>
           </a:xfrm>
         </p:spPr>
         <p:txBody>
@@ -1679,8 +1679,8 @@
         </p:nvSpPr>
         <p:spPr>
           <a:xfrm>
-            <a:off x="6967539" y="1449917"/>
-            <a:ext cx="6062664" cy="2634192"/>
+            <a:off x="4645026" y="1449917"/>
+            <a:ext cx="4041776" cy="2634192"/>
           </a:xfrm>
         </p:spPr>
         <p:txBody>
@@ -1769,7 +1769,7 @@
           <a:p>
             <a:fld id="{6666019B-6789-7642-8563-2C9E17E98A28}" type="datetimeFigureOut">
               <a:rPr lang="en-US" smtClean="0"/>
-              <a:t>12/6/16</a:t>
+              <a:t>2/17/17</a:t>
             </a:fld>
             <a:endParaRPr lang="en-US"/>
           </a:p>
@@ -1887,7 +1887,7 @@
           <a:p>
             <a:fld id="{6666019B-6789-7642-8563-2C9E17E98A28}" type="datetimeFigureOut">
               <a:rPr lang="en-US" smtClean="0"/>
-              <a:t>12/6/16</a:t>
+              <a:t>2/17/17</a:t>
             </a:fld>
             <a:endParaRPr lang="en-US"/>
           </a:p>
@@ -1982,7 +1982,7 @@
           <a:p>
             <a:fld id="{6666019B-6789-7642-8563-2C9E17E98A28}" type="datetimeFigureOut">
               <a:rPr lang="en-US" smtClean="0"/>
-              <a:t>12/6/16</a:t>
+              <a:t>2/17/17</a:t>
             </a:fld>
             <a:endParaRPr lang="en-US"/>
           </a:p>
@@ -2072,8 +2072,8 @@
         </p:nvSpPr>
         <p:spPr>
           <a:xfrm>
-            <a:off x="685801" y="182033"/>
-            <a:ext cx="4512470" cy="774700"/>
+            <a:off x="457201" y="182033"/>
+            <a:ext cx="3008313" cy="774700"/>
           </a:xfrm>
         </p:spPr>
         <p:txBody>
@@ -2104,8 +2104,8 @@
         </p:nvSpPr>
         <p:spPr>
           <a:xfrm>
-            <a:off x="5362578" y="182037"/>
-            <a:ext cx="7667625" cy="3902075"/>
+            <a:off x="3575052" y="182038"/>
+            <a:ext cx="5111750" cy="3902075"/>
           </a:xfrm>
         </p:spPr>
         <p:txBody>
@@ -2189,8 +2189,8 @@
         </p:nvSpPr>
         <p:spPr>
           <a:xfrm>
-            <a:off x="685801" y="956737"/>
-            <a:ext cx="4512470" cy="3127375"/>
+            <a:off x="457201" y="956738"/>
+            <a:ext cx="3008313" cy="3127375"/>
           </a:xfrm>
         </p:spPr>
         <p:txBody>
@@ -2259,7 +2259,7 @@
           <a:p>
             <a:fld id="{6666019B-6789-7642-8563-2C9E17E98A28}" type="datetimeFigureOut">
               <a:rPr lang="en-US" smtClean="0"/>
-              <a:t>12/6/16</a:t>
+              <a:t>2/17/17</a:t>
             </a:fld>
             <a:endParaRPr lang="en-US"/>
           </a:p>
@@ -2349,8 +2349,8 @@
         </p:nvSpPr>
         <p:spPr>
           <a:xfrm>
-            <a:off x="2688434" y="3200403"/>
-            <a:ext cx="8229600" cy="377825"/>
+            <a:off x="1792289" y="3200404"/>
+            <a:ext cx="5486400" cy="377825"/>
           </a:xfrm>
         </p:spPr>
         <p:txBody>
@@ -2381,8 +2381,8 @@
         </p:nvSpPr>
         <p:spPr>
           <a:xfrm>
-            <a:off x="2688434" y="408517"/>
-            <a:ext cx="8229600" cy="2743200"/>
+            <a:off x="1792289" y="408517"/>
+            <a:ext cx="5486400" cy="2743200"/>
           </a:xfrm>
         </p:spPr>
         <p:txBody>
@@ -2442,8 +2442,8 @@
         </p:nvSpPr>
         <p:spPr>
           <a:xfrm>
-            <a:off x="2688434" y="3578228"/>
-            <a:ext cx="8229600" cy="536575"/>
+            <a:off x="1792289" y="3578229"/>
+            <a:ext cx="5486400" cy="536575"/>
           </a:xfrm>
         </p:spPr>
         <p:txBody>
@@ -2512,7 +2512,7 @@
           <a:p>
             <a:fld id="{6666019B-6789-7642-8563-2C9E17E98A28}" type="datetimeFigureOut">
               <a:rPr lang="en-US" smtClean="0"/>
-              <a:t>12/6/16</a:t>
+              <a:t>2/17/17</a:t>
             </a:fld>
             <a:endParaRPr lang="en-US"/>
           </a:p>
@@ -2607,8 +2607,8 @@
         </p:nvSpPr>
         <p:spPr>
           <a:xfrm>
-            <a:off x="685800" y="183092"/>
-            <a:ext cx="12344400" cy="762000"/>
+            <a:off x="457200" y="183092"/>
+            <a:ext cx="8229600" cy="762000"/>
           </a:xfrm>
           <a:prstGeom prst="rect">
             <a:avLst/>
@@ -2640,8 +2640,8 @@
         </p:nvSpPr>
         <p:spPr>
           <a:xfrm>
-            <a:off x="685800" y="1066803"/>
-            <a:ext cx="12344400" cy="3017309"/>
+            <a:off x="457200" y="1066804"/>
+            <a:ext cx="8229600" cy="3017309"/>
           </a:xfrm>
           <a:prstGeom prst="rect">
             <a:avLst/>
@@ -2702,8 +2702,8 @@
         </p:nvSpPr>
         <p:spPr>
           <a:xfrm>
-            <a:off x="685800" y="4237570"/>
-            <a:ext cx="3200400" cy="243417"/>
+            <a:off x="457200" y="4237571"/>
+            <a:ext cx="2133600" cy="243417"/>
           </a:xfrm>
           <a:prstGeom prst="rect">
             <a:avLst/>
@@ -2725,7 +2725,7 @@
           <a:p>
             <a:fld id="{6666019B-6789-7642-8563-2C9E17E98A28}" type="datetimeFigureOut">
               <a:rPr lang="en-US" smtClean="0"/>
-              <a:t>12/6/16</a:t>
+              <a:t>2/17/17</a:t>
             </a:fld>
             <a:endParaRPr lang="en-US"/>
           </a:p>
@@ -2743,8 +2743,8 @@
         </p:nvSpPr>
         <p:spPr>
           <a:xfrm>
-            <a:off x="4686300" y="4237570"/>
-            <a:ext cx="4343400" cy="243417"/>
+            <a:off x="3124200" y="4237571"/>
+            <a:ext cx="2895600" cy="243417"/>
           </a:xfrm>
           <a:prstGeom prst="rect">
             <a:avLst/>
@@ -2780,8 +2780,8 @@
         </p:nvSpPr>
         <p:spPr>
           <a:xfrm>
-            <a:off x="9829800" y="4237570"/>
-            <a:ext cx="3200400" cy="243417"/>
+            <a:off x="6553200" y="4237571"/>
+            <a:ext cx="2133600" cy="243417"/>
           </a:xfrm>
           <a:prstGeom prst="rect">
             <a:avLst/>
@@ -3102,7 +3102,7 @@
       </p:grpSpPr>
       <p:sp>
         <p:nvSpPr>
-          <p:cNvPr id="30" name="Oval 29"/>
+          <p:cNvPr id="63" name="Oval 62"/>
           <p:cNvSpPr/>
           <p:nvPr/>
         </p:nvSpPr>
@@ -3149,7 +3149,7 @@
       </p:sp>
       <p:sp>
         <p:nvSpPr>
-          <p:cNvPr id="31" name="Rectangle 30"/>
+          <p:cNvPr id="64" name="Rectangle 63"/>
           <p:cNvSpPr/>
           <p:nvPr/>
         </p:nvSpPr>
@@ -3196,7 +3196,7 @@
       </p:sp>
       <p:cxnSp>
         <p:nvCxnSpPr>
-          <p:cNvPr id="32" name="Straight Arrow Connector 31"/>
+          <p:cNvPr id="67" name="Straight Arrow Connector 66"/>
           <p:cNvCxnSpPr/>
           <p:nvPr/>
         </p:nvCxnSpPr>
@@ -3232,7 +3232,7 @@
       </p:cxnSp>
       <p:cxnSp>
         <p:nvCxnSpPr>
-          <p:cNvPr id="33" name="Straight Arrow Connector 32"/>
+          <p:cNvPr id="68" name="Straight Arrow Connector 67"/>
           <p:cNvCxnSpPr/>
           <p:nvPr/>
         </p:nvCxnSpPr>
@@ -3268,7 +3268,7 @@
       </p:cxnSp>
       <p:cxnSp>
         <p:nvCxnSpPr>
-          <p:cNvPr id="34" name="Straight Arrow Connector 33"/>
+          <p:cNvPr id="69" name="Straight Arrow Connector 68"/>
           <p:cNvCxnSpPr/>
           <p:nvPr/>
         </p:nvCxnSpPr>
@@ -3304,7 +3304,7 @@
       </p:cxnSp>
       <p:cxnSp>
         <p:nvCxnSpPr>
-          <p:cNvPr id="35" name="Straight Arrow Connector 34"/>
+          <p:cNvPr id="70" name="Straight Arrow Connector 69"/>
           <p:cNvCxnSpPr/>
           <p:nvPr/>
         </p:nvCxnSpPr>
@@ -3340,7 +3340,7 @@
       </p:cxnSp>
       <p:cxnSp>
         <p:nvCxnSpPr>
-          <p:cNvPr id="36" name="Straight Arrow Connector 35"/>
+          <p:cNvPr id="71" name="Straight Arrow Connector 70"/>
           <p:cNvCxnSpPr/>
           <p:nvPr/>
         </p:nvCxnSpPr>
@@ -3376,7 +3376,7 @@
       </p:cxnSp>
       <p:sp>
         <p:nvSpPr>
-          <p:cNvPr id="37" name="TextBox 36"/>
+          <p:cNvPr id="72" name="TextBox 71"/>
           <p:cNvSpPr txBox="1"/>
           <p:nvPr/>
         </p:nvSpPr>
@@ -3414,7 +3414,7 @@
       </p:sp>
       <p:sp>
         <p:nvSpPr>
-          <p:cNvPr id="38" name="TextBox 37"/>
+          <p:cNvPr id="73" name="TextBox 72"/>
           <p:cNvSpPr txBox="1"/>
           <p:nvPr/>
         </p:nvSpPr>
@@ -3466,7 +3466,7 @@
       </p:sp>
       <p:sp>
         <p:nvSpPr>
-          <p:cNvPr id="39" name="TextBox 38"/>
+          <p:cNvPr id="74" name="TextBox 73"/>
           <p:cNvSpPr txBox="1"/>
           <p:nvPr/>
         </p:nvSpPr>
@@ -3541,7 +3541,7 @@
       </p:sp>
       <p:sp>
         <p:nvSpPr>
-          <p:cNvPr id="40" name="TextBox 39"/>
+          <p:cNvPr id="75" name="TextBox 74"/>
           <p:cNvSpPr txBox="1"/>
           <p:nvPr/>
         </p:nvSpPr>
@@ -3623,7 +3623,7 @@
       </p:sp>
       <p:sp>
         <p:nvSpPr>
-          <p:cNvPr id="41" name="TextBox 40"/>
+          <p:cNvPr id="76" name="TextBox 75"/>
           <p:cNvSpPr txBox="1"/>
           <p:nvPr/>
         </p:nvSpPr>
@@ -3665,7 +3665,7 @@
       </p:sp>
       <p:sp>
         <p:nvSpPr>
-          <p:cNvPr id="42" name="TextBox 41"/>
+          <p:cNvPr id="77" name="TextBox 76"/>
           <p:cNvSpPr txBox="1"/>
           <p:nvPr/>
         </p:nvSpPr>
@@ -3707,7 +3707,7 @@
       </p:sp>
       <p:sp>
         <p:nvSpPr>
-          <p:cNvPr id="43" name="Oval 42"/>
+          <p:cNvPr id="78" name="Oval 77"/>
           <p:cNvSpPr/>
           <p:nvPr/>
         </p:nvSpPr>
@@ -3754,7 +3754,7 @@
       </p:sp>
       <p:cxnSp>
         <p:nvCxnSpPr>
-          <p:cNvPr id="44" name="Straight Arrow Connector 43"/>
+          <p:cNvPr id="79" name="Straight Arrow Connector 78"/>
           <p:cNvCxnSpPr/>
           <p:nvPr/>
         </p:nvCxnSpPr>
@@ -3790,7 +3790,7 @@
       </p:cxnSp>
       <p:sp>
         <p:nvSpPr>
-          <p:cNvPr id="45" name="TextBox 44"/>
+          <p:cNvPr id="80" name="TextBox 79"/>
           <p:cNvSpPr txBox="1"/>
           <p:nvPr/>
         </p:nvSpPr>
@@ -3832,7 +3832,7 @@
       </p:sp>
       <p:sp>
         <p:nvSpPr>
-          <p:cNvPr id="46" name="Block Arc 45"/>
+          <p:cNvPr id="81" name="Block Arc 80"/>
           <p:cNvSpPr/>
           <p:nvPr/>
         </p:nvSpPr>
@@ -3888,7 +3888,7 @@
       </p:sp>
       <p:sp>
         <p:nvSpPr>
-          <p:cNvPr id="47" name="Oval 46"/>
+          <p:cNvPr id="83" name="Oval 82"/>
           <p:cNvSpPr/>
           <p:nvPr/>
         </p:nvSpPr>
@@ -3935,7 +3935,7 @@
       </p:sp>
       <p:sp>
         <p:nvSpPr>
-          <p:cNvPr id="48" name="Rectangle 47"/>
+          <p:cNvPr id="84" name="Rectangle 83"/>
           <p:cNvSpPr/>
           <p:nvPr/>
         </p:nvSpPr>
@@ -3982,7 +3982,7 @@
       </p:sp>
       <p:cxnSp>
         <p:nvCxnSpPr>
-          <p:cNvPr id="49" name="Straight Arrow Connector 48"/>
+          <p:cNvPr id="85" name="Straight Arrow Connector 84"/>
           <p:cNvCxnSpPr/>
           <p:nvPr/>
         </p:nvCxnSpPr>
@@ -4018,7 +4018,7 @@
       </p:cxnSp>
       <p:sp>
         <p:nvSpPr>
-          <p:cNvPr id="50" name="TextBox 49"/>
+          <p:cNvPr id="86" name="TextBox 85"/>
           <p:cNvSpPr txBox="1"/>
           <p:nvPr/>
         </p:nvSpPr>
@@ -4070,7 +4070,7 @@
       </p:sp>
       <p:sp>
         <p:nvSpPr>
-          <p:cNvPr id="51" name="Oval 50"/>
+          <p:cNvPr id="87" name="Oval 86"/>
           <p:cNvSpPr/>
           <p:nvPr/>
         </p:nvSpPr>
@@ -4117,7 +4117,7 @@
       </p:sp>
       <p:cxnSp>
         <p:nvCxnSpPr>
-          <p:cNvPr id="52" name="Straight Arrow Connector 51"/>
+          <p:cNvPr id="88" name="Straight Arrow Connector 87"/>
           <p:cNvCxnSpPr/>
           <p:nvPr/>
         </p:nvCxnSpPr>
@@ -4153,7 +4153,7 @@
       </p:cxnSp>
       <p:sp>
         <p:nvSpPr>
-          <p:cNvPr id="53" name="TextBox 52"/>
+          <p:cNvPr id="89" name="TextBox 88"/>
           <p:cNvSpPr txBox="1"/>
           <p:nvPr/>
         </p:nvSpPr>
@@ -4195,7 +4195,7 @@
       </p:sp>
       <p:cxnSp>
         <p:nvCxnSpPr>
-          <p:cNvPr id="54" name="Straight Arrow Connector 53"/>
+          <p:cNvPr id="90" name="Straight Arrow Connector 89"/>
           <p:cNvCxnSpPr/>
           <p:nvPr/>
         </p:nvCxnSpPr>
@@ -4231,7 +4231,7 @@
       </p:cxnSp>
       <p:cxnSp>
         <p:nvCxnSpPr>
-          <p:cNvPr id="55" name="Straight Arrow Connector 54"/>
+          <p:cNvPr id="91" name="Straight Arrow Connector 90"/>
           <p:cNvCxnSpPr/>
           <p:nvPr/>
         </p:nvCxnSpPr>
@@ -4267,7 +4267,7 @@
       </p:cxnSp>
       <p:sp>
         <p:nvSpPr>
-          <p:cNvPr id="56" name="TextBox 55"/>
+          <p:cNvPr id="92" name="TextBox 91"/>
           <p:cNvSpPr txBox="1"/>
           <p:nvPr/>
         </p:nvSpPr>
@@ -4309,7 +4309,7 @@
       </p:sp>
       <p:sp>
         <p:nvSpPr>
-          <p:cNvPr id="57" name="Block Arc 56"/>
+          <p:cNvPr id="93" name="Block Arc 92"/>
           <p:cNvSpPr/>
           <p:nvPr/>
         </p:nvSpPr>
@@ -4365,7 +4365,7 @@
       </p:sp>
       <p:sp>
         <p:nvSpPr>
-          <p:cNvPr id="58" name="Oval 57"/>
+          <p:cNvPr id="94" name="Oval 93"/>
           <p:cNvSpPr/>
           <p:nvPr/>
         </p:nvSpPr>
@@ -4412,7 +4412,7 @@
       </p:sp>
       <p:sp>
         <p:nvSpPr>
-          <p:cNvPr id="59" name="Rectangle 58"/>
+          <p:cNvPr id="95" name="Rectangle 94"/>
           <p:cNvSpPr/>
           <p:nvPr/>
         </p:nvSpPr>
@@ -4459,7 +4459,7 @@
       </p:sp>
       <p:sp>
         <p:nvSpPr>
-          <p:cNvPr id="61" name="Oval 60"/>
+          <p:cNvPr id="96" name="Oval 95"/>
           <p:cNvSpPr/>
           <p:nvPr/>
         </p:nvSpPr>
@@ -4506,7 +4506,7 @@
       </p:sp>
       <p:cxnSp>
         <p:nvCxnSpPr>
-          <p:cNvPr id="65" name="Straight Arrow Connector 64"/>
+          <p:cNvPr id="97" name="Straight Arrow Connector 96"/>
           <p:cNvCxnSpPr/>
           <p:nvPr/>
         </p:nvCxnSpPr>
@@ -4542,7 +4542,7 @@
       </p:cxnSp>
       <p:cxnSp>
         <p:nvCxnSpPr>
-          <p:cNvPr id="14" name="Straight Connector 13"/>
+          <p:cNvPr id="98" name="Straight Connector 97"/>
           <p:cNvCxnSpPr/>
           <p:nvPr/>
         </p:nvCxnSpPr>
@@ -4572,7 +4572,7 @@
       </p:cxnSp>
       <p:cxnSp>
         <p:nvCxnSpPr>
-          <p:cNvPr id="16" name="Straight Connector 15"/>
+          <p:cNvPr id="99" name="Straight Connector 98"/>
           <p:cNvCxnSpPr/>
           <p:nvPr/>
         </p:nvCxnSpPr>
@@ -4605,7 +4605,7 @@
       </p:cxnSp>
       <p:cxnSp>
         <p:nvCxnSpPr>
-          <p:cNvPr id="82" name="Straight Arrow Connector 81"/>
+          <p:cNvPr id="100" name="Straight Arrow Connector 99"/>
           <p:cNvCxnSpPr/>
           <p:nvPr/>
         </p:nvCxnSpPr>
@@ -4641,7 +4641,7 @@
       </p:cxnSp>
       <p:cxnSp>
         <p:nvCxnSpPr>
-          <p:cNvPr id="109" name="Straight Arrow Connector 108"/>
+          <p:cNvPr id="101" name="Straight Arrow Connector 100"/>
           <p:cNvCxnSpPr/>
           <p:nvPr/>
         </p:nvCxnSpPr>
@@ -4677,7 +4677,7 @@
       </p:cxnSp>
       <p:cxnSp>
         <p:nvCxnSpPr>
-          <p:cNvPr id="110" name="Straight Arrow Connector 109"/>
+          <p:cNvPr id="102" name="Straight Arrow Connector 101"/>
           <p:cNvCxnSpPr/>
           <p:nvPr/>
         </p:nvCxnSpPr>
@@ -4713,7 +4713,7 @@
       </p:cxnSp>
       <p:cxnSp>
         <p:nvCxnSpPr>
-          <p:cNvPr id="111" name="Straight Arrow Connector 110"/>
+          <p:cNvPr id="103" name="Straight Arrow Connector 102"/>
           <p:cNvCxnSpPr/>
           <p:nvPr/>
         </p:nvCxnSpPr>
@@ -4749,7 +4749,7 @@
       </p:cxnSp>
       <p:cxnSp>
         <p:nvCxnSpPr>
-          <p:cNvPr id="112" name="Straight Arrow Connector 111"/>
+          <p:cNvPr id="104" name="Straight Arrow Connector 103"/>
           <p:cNvCxnSpPr/>
           <p:nvPr/>
         </p:nvCxnSpPr>
@@ -4785,7 +4785,7 @@
       </p:cxnSp>
       <p:cxnSp>
         <p:nvCxnSpPr>
-          <p:cNvPr id="113" name="Straight Arrow Connector 112"/>
+          <p:cNvPr id="105" name="Straight Arrow Connector 104"/>
           <p:cNvCxnSpPr/>
           <p:nvPr/>
         </p:nvCxnSpPr>
@@ -4821,7 +4821,7 @@
       </p:cxnSp>
       <p:cxnSp>
         <p:nvCxnSpPr>
-          <p:cNvPr id="114" name="Straight Arrow Connector 113"/>
+          <p:cNvPr id="106" name="Straight Arrow Connector 105"/>
           <p:cNvCxnSpPr/>
           <p:nvPr/>
         </p:nvCxnSpPr>
@@ -4857,7 +4857,7 @@
       </p:cxnSp>
       <p:cxnSp>
         <p:nvCxnSpPr>
-          <p:cNvPr id="115" name="Straight Arrow Connector 114"/>
+          <p:cNvPr id="107" name="Straight Arrow Connector 106"/>
           <p:cNvCxnSpPr/>
           <p:nvPr/>
         </p:nvCxnSpPr>
@@ -4893,7 +4893,7 @@
       </p:cxnSp>
       <p:cxnSp>
         <p:nvCxnSpPr>
-          <p:cNvPr id="116" name="Straight Arrow Connector 115"/>
+          <p:cNvPr id="108" name="Straight Arrow Connector 107"/>
           <p:cNvCxnSpPr/>
           <p:nvPr/>
         </p:nvCxnSpPr>
@@ -4929,7 +4929,7 @@
       </p:cxnSp>
       <p:sp>
         <p:nvSpPr>
-          <p:cNvPr id="27" name="TextBox 26"/>
+          <p:cNvPr id="120" name="TextBox 119"/>
           <p:cNvSpPr txBox="1"/>
           <p:nvPr/>
         </p:nvSpPr>
@@ -4965,7 +4965,7 @@
       </p:sp>
       <p:sp>
         <p:nvSpPr>
-          <p:cNvPr id="117" name="TextBox 116"/>
+          <p:cNvPr id="121" name="TextBox 120"/>
           <p:cNvSpPr txBox="1"/>
           <p:nvPr/>
         </p:nvSpPr>
@@ -5001,7 +5001,7 @@
       </p:sp>
       <p:sp>
         <p:nvSpPr>
-          <p:cNvPr id="66" name="TextBox 65"/>
+          <p:cNvPr id="122" name="TextBox 121"/>
           <p:cNvSpPr txBox="1"/>
           <p:nvPr/>
         </p:nvSpPr>
@@ -5037,7 +5037,7 @@
       </p:sp>
       <p:sp>
         <p:nvSpPr>
-          <p:cNvPr id="118" name="TextBox 117"/>
+          <p:cNvPr id="123" name="TextBox 122"/>
           <p:cNvSpPr txBox="1"/>
           <p:nvPr/>
         </p:nvSpPr>
@@ -5080,7 +5080,7 @@
       </p:sp>
       <p:sp>
         <p:nvSpPr>
-          <p:cNvPr id="119" name="TextBox 118"/>
+          <p:cNvPr id="124" name="TextBox 123"/>
           <p:cNvSpPr txBox="1"/>
           <p:nvPr/>
         </p:nvSpPr>
@@ -5123,7 +5123,7 @@
       </p:sp>
       <p:cxnSp>
         <p:nvCxnSpPr>
-          <p:cNvPr id="60" name="Straight Arrow Connector 59"/>
+          <p:cNvPr id="125" name="Straight Arrow Connector 124"/>
           <p:cNvCxnSpPr/>
           <p:nvPr/>
         </p:nvCxnSpPr>
@@ -5160,7 +5160,7 @@
       </p:cxnSp>
       <p:sp>
         <p:nvSpPr>
-          <p:cNvPr id="62" name="TextBox 61"/>
+          <p:cNvPr id="126" name="TextBox 125"/>
           <p:cNvSpPr txBox="1"/>
           <p:nvPr/>
         </p:nvSpPr>
@@ -5198,7 +5198,7 @@
       </p:sp>
       <p:cxnSp>
         <p:nvCxnSpPr>
-          <p:cNvPr id="3" name="Straight Connector 2"/>
+          <p:cNvPr id="127" name="Straight Connector 126"/>
           <p:cNvCxnSpPr/>
           <p:nvPr/>
         </p:nvCxnSpPr>

</xml_diff>